<commit_message>
Get rid of the shadows below the arrows
</commit_message>
<xml_diff>
--- a/doc/kaggle_blog_post.pptx
+++ b/doc/kaggle_blog_post.pptx
@@ -105,6 +105,22 @@
       </a:defRPr>
     </a:lvl9pPr>
   </p:defaultTextStyle>
+  <p:extLst>
+    <p:ext uri="{EFAFB233-063F-42B5-8137-9DF3F51BA10A}">
+      <p15:sldGuideLst xmlns:p15="http://schemas.microsoft.com/office/powerpoint/2012/main">
+        <p15:guide id="1" orient="horz" pos="2160">
+          <p15:clr>
+            <a:srgbClr val="A4A3A4"/>
+          </p15:clr>
+        </p15:guide>
+        <p15:guide id="2" pos="2880">
+          <p15:clr>
+            <a:srgbClr val="A4A3A4"/>
+          </p15:clr>
+        </p15:guide>
+      </p15:sldGuideLst>
+    </p:ext>
+  </p:extLst>
 </p:presentation>
 </file>
 
@@ -289,7 +305,7 @@
           <a:p>
             <a:fld id="{83EA0970-0739-3645-BC6A-11E6E68B3B76}" type="datetimeFigureOut">
               <a:rPr lang="fr-FR" smtClean="0"/>
-              <a:t>7/11/15</a:t>
+              <a:t>12/07/2015</a:t>
             </a:fld>
             <a:endParaRPr lang="fr-FR"/>
           </a:p>
@@ -459,7 +475,7 @@
           <a:p>
             <a:fld id="{83EA0970-0739-3645-BC6A-11E6E68B3B76}" type="datetimeFigureOut">
               <a:rPr lang="fr-FR" smtClean="0"/>
-              <a:t>7/11/15</a:t>
+              <a:t>12/07/2015</a:t>
             </a:fld>
             <a:endParaRPr lang="fr-FR"/>
           </a:p>
@@ -639,7 +655,7 @@
           <a:p>
             <a:fld id="{83EA0970-0739-3645-BC6A-11E6E68B3B76}" type="datetimeFigureOut">
               <a:rPr lang="fr-FR" smtClean="0"/>
-              <a:t>7/11/15</a:t>
+              <a:t>12/07/2015</a:t>
             </a:fld>
             <a:endParaRPr lang="fr-FR"/>
           </a:p>
@@ -809,7 +825,7 @@
           <a:p>
             <a:fld id="{83EA0970-0739-3645-BC6A-11E6E68B3B76}" type="datetimeFigureOut">
               <a:rPr lang="fr-FR" smtClean="0"/>
-              <a:t>7/11/15</a:t>
+              <a:t>12/07/2015</a:t>
             </a:fld>
             <a:endParaRPr lang="fr-FR"/>
           </a:p>
@@ -1055,7 +1071,7 @@
           <a:p>
             <a:fld id="{83EA0970-0739-3645-BC6A-11E6E68B3B76}" type="datetimeFigureOut">
               <a:rPr lang="fr-FR" smtClean="0"/>
-              <a:t>7/11/15</a:t>
+              <a:t>12/07/2015</a:t>
             </a:fld>
             <a:endParaRPr lang="fr-FR"/>
           </a:p>
@@ -1343,7 +1359,7 @@
           <a:p>
             <a:fld id="{83EA0970-0739-3645-BC6A-11E6E68B3B76}" type="datetimeFigureOut">
               <a:rPr lang="fr-FR" smtClean="0"/>
-              <a:t>7/11/15</a:t>
+              <a:t>12/07/2015</a:t>
             </a:fld>
             <a:endParaRPr lang="fr-FR"/>
           </a:p>
@@ -1765,7 +1781,7 @@
           <a:p>
             <a:fld id="{83EA0970-0739-3645-BC6A-11E6E68B3B76}" type="datetimeFigureOut">
               <a:rPr lang="fr-FR" smtClean="0"/>
-              <a:t>7/11/15</a:t>
+              <a:t>12/07/2015</a:t>
             </a:fld>
             <a:endParaRPr lang="fr-FR"/>
           </a:p>
@@ -1883,7 +1899,7 @@
           <a:p>
             <a:fld id="{83EA0970-0739-3645-BC6A-11E6E68B3B76}" type="datetimeFigureOut">
               <a:rPr lang="fr-FR" smtClean="0"/>
-              <a:t>7/11/15</a:t>
+              <a:t>12/07/2015</a:t>
             </a:fld>
             <a:endParaRPr lang="fr-FR"/>
           </a:p>
@@ -1978,7 +1994,7 @@
           <a:p>
             <a:fld id="{83EA0970-0739-3645-BC6A-11E6E68B3B76}" type="datetimeFigureOut">
               <a:rPr lang="fr-FR" smtClean="0"/>
-              <a:t>7/11/15</a:t>
+              <a:t>12/07/2015</a:t>
             </a:fld>
             <a:endParaRPr lang="fr-FR"/>
           </a:p>
@@ -2255,7 +2271,7 @@
           <a:p>
             <a:fld id="{83EA0970-0739-3645-BC6A-11E6E68B3B76}" type="datetimeFigureOut">
               <a:rPr lang="fr-FR" smtClean="0"/>
-              <a:t>7/11/15</a:t>
+              <a:t>12/07/2015</a:t>
             </a:fld>
             <a:endParaRPr lang="fr-FR"/>
           </a:p>
@@ -2508,7 +2524,7 @@
           <a:p>
             <a:fld id="{83EA0970-0739-3645-BC6A-11E6E68B3B76}" type="datetimeFigureOut">
               <a:rPr lang="fr-FR" smtClean="0"/>
-              <a:t>7/11/15</a:t>
+              <a:t>12/07/2015</a:t>
             </a:fld>
             <a:endParaRPr lang="fr-FR"/>
           </a:p>
@@ -2721,7 +2737,7 @@
           <a:p>
             <a:fld id="{83EA0970-0739-3645-BC6A-11E6E68B3B76}" type="datetimeFigureOut">
               <a:rPr lang="fr-FR" smtClean="0"/>
-              <a:t>7/11/15</a:t>
+              <a:t>12/07/2015</a:t>
             </a:fld>
             <a:endParaRPr lang="fr-FR"/>
           </a:p>
@@ -3354,42 +3370,42 @@
           <a:p>
             <a:pPr algn="ctr"/>
             <a:r>
-              <a:rPr lang="fr-FR" dirty="0" err="1" smtClean="0"/>
+              <a:rPr lang="fr-FR" sz="1600" dirty="0" err="1" smtClean="0"/>
               <a:t>Other</a:t>
             </a:r>
             <a:r>
-              <a:rPr lang="fr-FR" dirty="0" smtClean="0"/>
+              <a:rPr lang="fr-FR" sz="1600" dirty="0" smtClean="0"/>
               <a:t> </a:t>
             </a:r>
             <a:r>
-              <a:rPr lang="fr-FR" dirty="0" err="1" smtClean="0"/>
+              <a:rPr lang="fr-FR" sz="1600" dirty="0" err="1" smtClean="0"/>
               <a:t>metadata</a:t>
             </a:r>
             <a:r>
-              <a:rPr lang="fr-FR" dirty="0" smtClean="0"/>
+              <a:rPr lang="fr-FR" sz="1600" dirty="0" smtClean="0"/>
               <a:t> </a:t>
             </a:r>
             <a:r>
-              <a:rPr lang="fr-FR" dirty="0" err="1" smtClean="0"/>
+              <a:rPr lang="fr-FR" sz="1600" dirty="0" err="1" smtClean="0"/>
               <a:t>embeddings</a:t>
             </a:r>
             <a:r>
-              <a:rPr lang="fr-FR" dirty="0" smtClean="0"/>
+              <a:rPr lang="fr-FR" sz="1600" dirty="0" smtClean="0"/>
               <a:t> </a:t>
             </a:r>
             <a:r>
-              <a:rPr lang="fr-FR" sz="1200" dirty="0" smtClean="0"/>
+              <a:rPr lang="fr-FR" sz="1100" dirty="0" smtClean="0"/>
               <a:t>(</a:t>
             </a:r>
             <a:r>
-              <a:rPr lang="fr-FR" sz="1200" dirty="0" err="1" smtClean="0"/>
+              <a:rPr lang="fr-FR" sz="1100" dirty="0" err="1" smtClean="0"/>
               <a:t>each</a:t>
             </a:r>
             <a:r>
-              <a:rPr lang="fr-FR" sz="1200" dirty="0" smtClean="0"/>
+              <a:rPr lang="fr-FR" sz="1100" dirty="0" smtClean="0"/>
               <a:t> of size 10)</a:t>
             </a:r>
-            <a:endParaRPr lang="fr-FR" dirty="0" smtClean="0"/>
+            <a:endParaRPr lang="fr-FR" sz="1600" dirty="0" smtClean="0"/>
           </a:p>
         </p:txBody>
       </p:sp>
@@ -3642,22 +3658,19 @@
           <a:prstGeom prst="straightConnector1">
             <a:avLst/>
           </a:prstGeom>
-          <a:ln w="9525" cmpd="sng">
-            <a:solidFill>
-              <a:schemeClr val="tx1"/>
-            </a:solidFill>
+          <a:ln>
             <a:tailEnd type="arrow"/>
           </a:ln>
         </p:spPr>
         <p:style>
-          <a:lnRef idx="2">
-            <a:schemeClr val="accent1"/>
+          <a:lnRef idx="1">
+            <a:schemeClr val="dk1"/>
           </a:lnRef>
           <a:fillRef idx="0">
-            <a:schemeClr val="accent1"/>
+            <a:schemeClr val="dk1"/>
           </a:fillRef>
-          <a:effectRef idx="1">
-            <a:schemeClr val="accent1"/>
+          <a:effectRef idx="0">
+            <a:schemeClr val="dk1"/>
           </a:effectRef>
           <a:fontRef idx="minor">
             <a:schemeClr val="tx1"/>
@@ -3681,22 +3694,19 @@
           <a:prstGeom prst="straightConnector1">
             <a:avLst/>
           </a:prstGeom>
-          <a:ln w="9525" cmpd="sng">
-            <a:solidFill>
-              <a:schemeClr val="tx1"/>
-            </a:solidFill>
+          <a:ln>
             <a:tailEnd type="arrow"/>
           </a:ln>
         </p:spPr>
         <p:style>
-          <a:lnRef idx="2">
-            <a:schemeClr val="accent1"/>
+          <a:lnRef idx="1">
+            <a:schemeClr val="dk1"/>
           </a:lnRef>
           <a:fillRef idx="0">
-            <a:schemeClr val="accent1"/>
+            <a:schemeClr val="dk1"/>
           </a:fillRef>
-          <a:effectRef idx="1">
-            <a:schemeClr val="accent1"/>
+          <a:effectRef idx="0">
+            <a:schemeClr val="dk1"/>
           </a:effectRef>
           <a:fontRef idx="minor">
             <a:schemeClr val="tx1"/>
@@ -3720,22 +3730,19 @@
           <a:prstGeom prst="straightConnector1">
             <a:avLst/>
           </a:prstGeom>
-          <a:ln w="9525" cmpd="sng">
-            <a:solidFill>
-              <a:schemeClr val="tx1"/>
-            </a:solidFill>
+          <a:ln>
             <a:tailEnd type="arrow"/>
           </a:ln>
         </p:spPr>
         <p:style>
-          <a:lnRef idx="2">
-            <a:schemeClr val="accent1"/>
+          <a:lnRef idx="1">
+            <a:schemeClr val="dk1"/>
           </a:lnRef>
           <a:fillRef idx="0">
-            <a:schemeClr val="accent1"/>
+            <a:schemeClr val="dk1"/>
           </a:fillRef>
-          <a:effectRef idx="1">
-            <a:schemeClr val="accent1"/>
+          <a:effectRef idx="0">
+            <a:schemeClr val="dk1"/>
           </a:effectRef>
           <a:fontRef idx="minor">
             <a:schemeClr val="tx1"/>
@@ -3759,22 +3766,19 @@
           <a:prstGeom prst="straightConnector1">
             <a:avLst/>
           </a:prstGeom>
-          <a:ln w="9525" cmpd="sng">
-            <a:solidFill>
-              <a:schemeClr val="tx1"/>
-            </a:solidFill>
+          <a:ln>
             <a:tailEnd type="arrow"/>
           </a:ln>
         </p:spPr>
         <p:style>
-          <a:lnRef idx="2">
-            <a:schemeClr val="accent1"/>
+          <a:lnRef idx="1">
+            <a:schemeClr val="dk1"/>
           </a:lnRef>
           <a:fillRef idx="0">
-            <a:schemeClr val="accent1"/>
+            <a:schemeClr val="dk1"/>
           </a:fillRef>
-          <a:effectRef idx="1">
-            <a:schemeClr val="accent1"/>
+          <a:effectRef idx="0">
+            <a:schemeClr val="dk1"/>
           </a:effectRef>
           <a:fontRef idx="minor">
             <a:schemeClr val="tx1"/>
@@ -3798,22 +3802,19 @@
           <a:prstGeom prst="straightConnector1">
             <a:avLst/>
           </a:prstGeom>
-          <a:ln w="9525" cmpd="sng">
-            <a:solidFill>
-              <a:schemeClr val="tx1"/>
-            </a:solidFill>
+          <a:ln>
             <a:tailEnd type="arrow"/>
           </a:ln>
         </p:spPr>
         <p:style>
-          <a:lnRef idx="2">
-            <a:schemeClr val="accent1"/>
+          <a:lnRef idx="1">
+            <a:schemeClr val="dk1"/>
           </a:lnRef>
           <a:fillRef idx="0">
-            <a:schemeClr val="accent1"/>
+            <a:schemeClr val="dk1"/>
           </a:fillRef>
-          <a:effectRef idx="1">
-            <a:schemeClr val="accent1"/>
+          <a:effectRef idx="0">
+            <a:schemeClr val="dk1"/>
           </a:effectRef>
           <a:fontRef idx="minor">
             <a:schemeClr val="tx1"/>
@@ -3837,22 +3838,19 @@
           <a:prstGeom prst="straightConnector1">
             <a:avLst/>
           </a:prstGeom>
-          <a:ln w="9525" cmpd="sng">
-            <a:solidFill>
-              <a:schemeClr val="tx1"/>
-            </a:solidFill>
+          <a:ln>
             <a:tailEnd type="arrow"/>
           </a:ln>
         </p:spPr>
         <p:style>
-          <a:lnRef idx="2">
-            <a:schemeClr val="accent1"/>
+          <a:lnRef idx="1">
+            <a:schemeClr val="dk1"/>
           </a:lnRef>
           <a:fillRef idx="0">
-            <a:schemeClr val="accent1"/>
+            <a:schemeClr val="dk1"/>
           </a:fillRef>
-          <a:effectRef idx="1">
-            <a:schemeClr val="accent1"/>
+          <a:effectRef idx="0">
+            <a:schemeClr val="dk1"/>
           </a:effectRef>
           <a:fontRef idx="minor">
             <a:schemeClr val="tx1"/>
@@ -3876,22 +3874,19 @@
           <a:prstGeom prst="straightConnector1">
             <a:avLst/>
           </a:prstGeom>
-          <a:ln w="9525" cmpd="sng">
-            <a:solidFill>
-              <a:schemeClr val="tx1"/>
-            </a:solidFill>
+          <a:ln>
             <a:tailEnd type="arrow"/>
           </a:ln>
         </p:spPr>
         <p:style>
-          <a:lnRef idx="2">
-            <a:schemeClr val="accent1"/>
+          <a:lnRef idx="1">
+            <a:schemeClr val="dk1"/>
           </a:lnRef>
           <a:fillRef idx="0">
-            <a:schemeClr val="accent1"/>
+            <a:schemeClr val="dk1"/>
           </a:fillRef>
-          <a:effectRef idx="1">
-            <a:schemeClr val="accent1"/>
+          <a:effectRef idx="0">
+            <a:schemeClr val="dk1"/>
           </a:effectRef>
           <a:fontRef idx="minor">
             <a:schemeClr val="tx1"/>
@@ -3915,22 +3910,19 @@
           <a:prstGeom prst="straightConnector1">
             <a:avLst/>
           </a:prstGeom>
-          <a:ln w="9525" cmpd="sng">
-            <a:solidFill>
-              <a:schemeClr val="tx1"/>
-            </a:solidFill>
+          <a:ln>
             <a:tailEnd type="arrow"/>
           </a:ln>
         </p:spPr>
         <p:style>
-          <a:lnRef idx="2">
-            <a:schemeClr val="accent1"/>
+          <a:lnRef idx="1">
+            <a:schemeClr val="dk1"/>
           </a:lnRef>
           <a:fillRef idx="0">
-            <a:schemeClr val="accent1"/>
+            <a:schemeClr val="dk1"/>
           </a:fillRef>
-          <a:effectRef idx="1">
-            <a:schemeClr val="accent1"/>
+          <a:effectRef idx="0">
+            <a:schemeClr val="dk1"/>
           </a:effectRef>
           <a:fontRef idx="minor">
             <a:schemeClr val="tx1"/>
@@ -3950,7 +3942,7 @@
   <p:timing>
     <p:tnLst>
       <p:par>
-        <p:cTn xmlns:p14="http://schemas.microsoft.com/office/powerpoint/2010/main" id="1" dur="indefinite" restart="never" nodeType="tmRoot"/>
+        <p:cTn id="1" dur="indefinite" restart="never" nodeType="tmRoot"/>
       </p:par>
     </p:tnLst>
   </p:timing>
@@ -4480,22 +4472,19 @@
           <a:prstGeom prst="straightConnector1">
             <a:avLst/>
           </a:prstGeom>
-          <a:ln w="9525" cmpd="sng">
-            <a:solidFill>
-              <a:schemeClr val="tx1"/>
-            </a:solidFill>
+          <a:ln>
             <a:tailEnd type="arrow"/>
           </a:ln>
         </p:spPr>
         <p:style>
-          <a:lnRef idx="2">
-            <a:schemeClr val="accent1"/>
+          <a:lnRef idx="1">
+            <a:schemeClr val="dk1"/>
           </a:lnRef>
           <a:fillRef idx="0">
-            <a:schemeClr val="accent1"/>
+            <a:schemeClr val="dk1"/>
           </a:fillRef>
-          <a:effectRef idx="1">
-            <a:schemeClr val="accent1"/>
+          <a:effectRef idx="0">
+            <a:schemeClr val="dk1"/>
           </a:effectRef>
           <a:fontRef idx="minor">
             <a:schemeClr val="tx1"/>
@@ -4519,22 +4508,19 @@
           <a:prstGeom prst="straightConnector1">
             <a:avLst/>
           </a:prstGeom>
-          <a:ln w="9525" cmpd="sng">
-            <a:solidFill>
-              <a:schemeClr val="tx1"/>
-            </a:solidFill>
+          <a:ln>
             <a:tailEnd type="arrow"/>
           </a:ln>
         </p:spPr>
         <p:style>
-          <a:lnRef idx="2">
-            <a:schemeClr val="accent1"/>
+          <a:lnRef idx="1">
+            <a:schemeClr val="dk1"/>
           </a:lnRef>
           <a:fillRef idx="0">
-            <a:schemeClr val="accent1"/>
+            <a:schemeClr val="dk1"/>
           </a:fillRef>
-          <a:effectRef idx="1">
-            <a:schemeClr val="accent1"/>
+          <a:effectRef idx="0">
+            <a:schemeClr val="dk1"/>
           </a:effectRef>
           <a:fontRef idx="minor">
             <a:schemeClr val="tx1"/>
@@ -4558,22 +4544,19 @@
           <a:prstGeom prst="straightConnector1">
             <a:avLst/>
           </a:prstGeom>
-          <a:ln w="9525" cmpd="sng">
-            <a:solidFill>
-              <a:schemeClr val="tx1"/>
-            </a:solidFill>
+          <a:ln>
             <a:tailEnd type="arrow"/>
           </a:ln>
         </p:spPr>
         <p:style>
-          <a:lnRef idx="2">
-            <a:schemeClr val="accent1"/>
+          <a:lnRef idx="1">
+            <a:schemeClr val="dk1"/>
           </a:lnRef>
           <a:fillRef idx="0">
-            <a:schemeClr val="accent1"/>
+            <a:schemeClr val="dk1"/>
           </a:fillRef>
-          <a:effectRef idx="1">
-            <a:schemeClr val="accent1"/>
+          <a:effectRef idx="0">
+            <a:schemeClr val="dk1"/>
           </a:effectRef>
           <a:fontRef idx="minor">
             <a:schemeClr val="tx1"/>
@@ -4597,22 +4580,19 @@
           <a:prstGeom prst="straightConnector1">
             <a:avLst/>
           </a:prstGeom>
-          <a:ln w="9525" cmpd="sng">
-            <a:solidFill>
-              <a:schemeClr val="tx1"/>
-            </a:solidFill>
+          <a:ln>
             <a:tailEnd type="arrow"/>
           </a:ln>
         </p:spPr>
         <p:style>
-          <a:lnRef idx="2">
-            <a:schemeClr val="accent1"/>
+          <a:lnRef idx="1">
+            <a:schemeClr val="dk1"/>
           </a:lnRef>
           <a:fillRef idx="0">
-            <a:schemeClr val="accent1"/>
+            <a:schemeClr val="dk1"/>
           </a:fillRef>
-          <a:effectRef idx="1">
-            <a:schemeClr val="accent1"/>
+          <a:effectRef idx="0">
+            <a:schemeClr val="dk1"/>
           </a:effectRef>
           <a:fontRef idx="minor">
             <a:schemeClr val="tx1"/>
@@ -4723,22 +4703,19 @@
           <a:prstGeom prst="straightConnector1">
             <a:avLst/>
           </a:prstGeom>
-          <a:ln w="9525" cmpd="sng">
-            <a:solidFill>
-              <a:schemeClr val="tx1"/>
-            </a:solidFill>
+          <a:ln>
             <a:tailEnd type="arrow"/>
           </a:ln>
         </p:spPr>
         <p:style>
-          <a:lnRef idx="2">
-            <a:schemeClr val="accent1"/>
+          <a:lnRef idx="1">
+            <a:schemeClr val="dk1"/>
           </a:lnRef>
           <a:fillRef idx="0">
-            <a:schemeClr val="accent1"/>
+            <a:schemeClr val="dk1"/>
           </a:fillRef>
-          <a:effectRef idx="1">
-            <a:schemeClr val="accent1"/>
+          <a:effectRef idx="0">
+            <a:schemeClr val="dk1"/>
           </a:effectRef>
           <a:fontRef idx="minor">
             <a:schemeClr val="tx1"/>
@@ -4762,22 +4739,19 @@
           <a:prstGeom prst="straightConnector1">
             <a:avLst/>
           </a:prstGeom>
-          <a:ln w="9525" cmpd="sng">
-            <a:solidFill>
-              <a:schemeClr val="tx1"/>
-            </a:solidFill>
+          <a:ln>
             <a:tailEnd type="arrow"/>
           </a:ln>
         </p:spPr>
         <p:style>
-          <a:lnRef idx="2">
-            <a:schemeClr val="accent1"/>
+          <a:lnRef idx="1">
+            <a:schemeClr val="dk1"/>
           </a:lnRef>
           <a:fillRef idx="0">
-            <a:schemeClr val="accent1"/>
+            <a:schemeClr val="dk1"/>
           </a:fillRef>
-          <a:effectRef idx="1">
-            <a:schemeClr val="accent1"/>
+          <a:effectRef idx="0">
+            <a:schemeClr val="dk1"/>
           </a:effectRef>
           <a:fontRef idx="minor">
             <a:schemeClr val="tx1"/>
@@ -4903,22 +4877,19 @@
           <a:prstGeom prst="straightConnector1">
             <a:avLst/>
           </a:prstGeom>
-          <a:ln w="9525" cmpd="sng">
-            <a:solidFill>
-              <a:schemeClr val="tx1"/>
-            </a:solidFill>
+          <a:ln>
             <a:tailEnd type="arrow"/>
           </a:ln>
         </p:spPr>
         <p:style>
-          <a:lnRef idx="2">
-            <a:schemeClr val="accent1"/>
+          <a:lnRef idx="1">
+            <a:schemeClr val="dk1"/>
           </a:lnRef>
           <a:fillRef idx="0">
-            <a:schemeClr val="accent1"/>
+            <a:schemeClr val="dk1"/>
           </a:fillRef>
-          <a:effectRef idx="1">
-            <a:schemeClr val="accent1"/>
+          <a:effectRef idx="0">
+            <a:schemeClr val="dk1"/>
           </a:effectRef>
           <a:fontRef idx="minor">
             <a:schemeClr val="tx1"/>
@@ -4981,22 +4952,19 @@
           <a:prstGeom prst="straightConnector1">
             <a:avLst/>
           </a:prstGeom>
-          <a:ln w="9525" cmpd="sng">
-            <a:solidFill>
-              <a:schemeClr val="tx1"/>
-            </a:solidFill>
+          <a:ln>
             <a:tailEnd type="arrow"/>
           </a:ln>
         </p:spPr>
         <p:style>
-          <a:lnRef idx="2">
-            <a:schemeClr val="accent1"/>
+          <a:lnRef idx="1">
+            <a:schemeClr val="dk1"/>
           </a:lnRef>
           <a:fillRef idx="0">
-            <a:schemeClr val="accent1"/>
+            <a:schemeClr val="dk1"/>
           </a:fillRef>
-          <a:effectRef idx="1">
-            <a:schemeClr val="accent1"/>
+          <a:effectRef idx="0">
+            <a:schemeClr val="dk1"/>
           </a:effectRef>
           <a:fontRef idx="minor">
             <a:schemeClr val="tx1"/>
@@ -5020,22 +4988,19 @@
           <a:prstGeom prst="straightConnector1">
             <a:avLst/>
           </a:prstGeom>
-          <a:ln w="9525" cmpd="sng">
-            <a:solidFill>
-              <a:schemeClr val="tx1"/>
-            </a:solidFill>
+          <a:ln>
             <a:tailEnd type="arrow"/>
           </a:ln>
         </p:spPr>
         <p:style>
-          <a:lnRef idx="2">
-            <a:schemeClr val="accent1"/>
+          <a:lnRef idx="1">
+            <a:schemeClr val="dk1"/>
           </a:lnRef>
           <a:fillRef idx="0">
-            <a:schemeClr val="accent1"/>
+            <a:schemeClr val="dk1"/>
           </a:fillRef>
-          <a:effectRef idx="1">
-            <a:schemeClr val="accent1"/>
+          <a:effectRef idx="0">
+            <a:schemeClr val="dk1"/>
           </a:effectRef>
           <a:fontRef idx="minor">
             <a:schemeClr val="tx1"/>
@@ -5254,22 +5219,19 @@
           <a:prstGeom prst="straightConnector1">
             <a:avLst/>
           </a:prstGeom>
-          <a:ln w="9525" cmpd="sng">
-            <a:solidFill>
-              <a:schemeClr val="tx1"/>
-            </a:solidFill>
+          <a:ln>
             <a:tailEnd type="arrow"/>
           </a:ln>
         </p:spPr>
         <p:style>
-          <a:lnRef idx="2">
-            <a:schemeClr val="accent1"/>
+          <a:lnRef idx="1">
+            <a:schemeClr val="dk1"/>
           </a:lnRef>
           <a:fillRef idx="0">
-            <a:schemeClr val="accent1"/>
+            <a:schemeClr val="dk1"/>
           </a:fillRef>
-          <a:effectRef idx="1">
-            <a:schemeClr val="accent1"/>
+          <a:effectRef idx="0">
+            <a:schemeClr val="dk1"/>
           </a:effectRef>
           <a:fontRef idx="minor">
             <a:schemeClr val="tx1"/>
@@ -5293,22 +5255,19 @@
           <a:prstGeom prst="straightConnector1">
             <a:avLst/>
           </a:prstGeom>
-          <a:ln w="9525" cmpd="sng">
-            <a:solidFill>
-              <a:schemeClr val="tx1"/>
-            </a:solidFill>
+          <a:ln>
             <a:tailEnd type="arrow"/>
           </a:ln>
         </p:spPr>
         <p:style>
-          <a:lnRef idx="2">
-            <a:schemeClr val="accent1"/>
+          <a:lnRef idx="1">
+            <a:schemeClr val="dk1"/>
           </a:lnRef>
           <a:fillRef idx="0">
-            <a:schemeClr val="accent1"/>
+            <a:schemeClr val="dk1"/>
           </a:fillRef>
-          <a:effectRef idx="1">
-            <a:schemeClr val="accent1"/>
+          <a:effectRef idx="0">
+            <a:schemeClr val="dk1"/>
           </a:effectRef>
           <a:fontRef idx="minor">
             <a:schemeClr val="tx1"/>
@@ -5332,22 +5291,19 @@
           <a:prstGeom prst="straightConnector1">
             <a:avLst/>
           </a:prstGeom>
-          <a:ln w="9525" cmpd="sng">
-            <a:solidFill>
-              <a:schemeClr val="tx1"/>
-            </a:solidFill>
+          <a:ln>
             <a:tailEnd type="arrow"/>
           </a:ln>
         </p:spPr>
         <p:style>
-          <a:lnRef idx="2">
-            <a:schemeClr val="accent1"/>
+          <a:lnRef idx="1">
+            <a:schemeClr val="dk1"/>
           </a:lnRef>
           <a:fillRef idx="0">
-            <a:schemeClr val="accent1"/>
+            <a:schemeClr val="dk1"/>
           </a:fillRef>
-          <a:effectRef idx="1">
-            <a:schemeClr val="accent1"/>
+          <a:effectRef idx="0">
+            <a:schemeClr val="dk1"/>
           </a:effectRef>
           <a:fontRef idx="minor">
             <a:schemeClr val="tx1"/>
@@ -5371,22 +5327,19 @@
           <a:prstGeom prst="straightConnector1">
             <a:avLst/>
           </a:prstGeom>
-          <a:ln w="9525" cmpd="sng">
-            <a:solidFill>
-              <a:schemeClr val="tx1"/>
-            </a:solidFill>
+          <a:ln>
             <a:tailEnd type="arrow"/>
           </a:ln>
         </p:spPr>
         <p:style>
-          <a:lnRef idx="2">
-            <a:schemeClr val="accent1"/>
+          <a:lnRef idx="1">
+            <a:schemeClr val="dk1"/>
           </a:lnRef>
           <a:fillRef idx="0">
-            <a:schemeClr val="accent1"/>
+            <a:schemeClr val="dk1"/>
           </a:fillRef>
-          <a:effectRef idx="1">
-            <a:schemeClr val="accent1"/>
+          <a:effectRef idx="0">
+            <a:schemeClr val="dk1"/>
           </a:effectRef>
           <a:fontRef idx="minor">
             <a:schemeClr val="tx1"/>
@@ -5410,22 +5363,19 @@
           <a:prstGeom prst="straightConnector1">
             <a:avLst/>
           </a:prstGeom>
-          <a:ln w="9525" cmpd="sng">
-            <a:solidFill>
-              <a:schemeClr val="tx1"/>
-            </a:solidFill>
+          <a:ln>
             <a:tailEnd type="arrow"/>
           </a:ln>
         </p:spPr>
         <p:style>
-          <a:lnRef idx="2">
-            <a:schemeClr val="accent1"/>
+          <a:lnRef idx="1">
+            <a:schemeClr val="dk1"/>
           </a:lnRef>
           <a:fillRef idx="0">
-            <a:schemeClr val="accent1"/>
+            <a:schemeClr val="dk1"/>
           </a:fillRef>
-          <a:effectRef idx="1">
-            <a:schemeClr val="accent1"/>
+          <a:effectRef idx="0">
+            <a:schemeClr val="dk1"/>
           </a:effectRef>
           <a:fontRef idx="minor">
             <a:schemeClr val="tx1"/>
@@ -5575,22 +5525,19 @@
           <a:prstGeom prst="straightConnector1">
             <a:avLst/>
           </a:prstGeom>
-          <a:ln w="9525" cmpd="sng">
-            <a:solidFill>
-              <a:schemeClr val="tx1"/>
-            </a:solidFill>
+          <a:ln>
             <a:tailEnd type="arrow"/>
           </a:ln>
         </p:spPr>
         <p:style>
-          <a:lnRef idx="2">
-            <a:schemeClr val="accent1"/>
+          <a:lnRef idx="1">
+            <a:schemeClr val="dk1"/>
           </a:lnRef>
           <a:fillRef idx="0">
-            <a:schemeClr val="accent1"/>
+            <a:schemeClr val="dk1"/>
           </a:fillRef>
-          <a:effectRef idx="1">
-            <a:schemeClr val="accent1"/>
+          <a:effectRef idx="0">
+            <a:schemeClr val="dk1"/>
           </a:effectRef>
           <a:fontRef idx="minor">
             <a:schemeClr val="tx1"/>
@@ -5614,22 +5561,19 @@
           <a:prstGeom prst="straightConnector1">
             <a:avLst/>
           </a:prstGeom>
-          <a:ln w="9525" cmpd="sng">
-            <a:solidFill>
-              <a:schemeClr val="tx1"/>
-            </a:solidFill>
+          <a:ln>
             <a:tailEnd type="arrow"/>
           </a:ln>
         </p:spPr>
         <p:style>
-          <a:lnRef idx="2">
-            <a:schemeClr val="accent1"/>
+          <a:lnRef idx="1">
+            <a:schemeClr val="dk1"/>
           </a:lnRef>
           <a:fillRef idx="0">
-            <a:schemeClr val="accent1"/>
+            <a:schemeClr val="dk1"/>
           </a:fillRef>
-          <a:effectRef idx="1">
-            <a:schemeClr val="accent1"/>
+          <a:effectRef idx="0">
+            <a:schemeClr val="dk1"/>
           </a:effectRef>
           <a:fontRef idx="minor">
             <a:schemeClr val="tx1"/>
@@ -5653,22 +5597,19 @@
           <a:prstGeom prst="straightConnector1">
             <a:avLst/>
           </a:prstGeom>
-          <a:ln w="9525" cmpd="sng">
-            <a:solidFill>
-              <a:schemeClr val="tx1"/>
-            </a:solidFill>
+          <a:ln>
             <a:tailEnd type="arrow"/>
           </a:ln>
         </p:spPr>
         <p:style>
-          <a:lnRef idx="2">
-            <a:schemeClr val="accent1"/>
+          <a:lnRef idx="1">
+            <a:schemeClr val="dk1"/>
           </a:lnRef>
           <a:fillRef idx="0">
-            <a:schemeClr val="accent1"/>
+            <a:schemeClr val="dk1"/>
           </a:fillRef>
-          <a:effectRef idx="1">
-            <a:schemeClr val="accent1"/>
+          <a:effectRef idx="0">
+            <a:schemeClr val="dk1"/>
           </a:effectRef>
           <a:fontRef idx="minor">
             <a:schemeClr val="tx1"/>
@@ -5692,22 +5633,19 @@
           <a:prstGeom prst="straightConnector1">
             <a:avLst/>
           </a:prstGeom>
-          <a:ln w="9525" cmpd="sng">
-            <a:solidFill>
-              <a:schemeClr val="tx1"/>
-            </a:solidFill>
+          <a:ln>
             <a:tailEnd type="arrow"/>
           </a:ln>
         </p:spPr>
         <p:style>
-          <a:lnRef idx="2">
-            <a:schemeClr val="accent1"/>
+          <a:lnRef idx="1">
+            <a:schemeClr val="dk1"/>
           </a:lnRef>
           <a:fillRef idx="0">
-            <a:schemeClr val="accent1"/>
+            <a:schemeClr val="dk1"/>
           </a:fillRef>
-          <a:effectRef idx="1">
-            <a:schemeClr val="accent1"/>
+          <a:effectRef idx="0">
+            <a:schemeClr val="dk1"/>
           </a:effectRef>
           <a:fontRef idx="minor">
             <a:schemeClr val="tx1"/>
@@ -5727,7 +5665,7 @@
   <p:timing>
     <p:tnLst>
       <p:par>
-        <p:cTn xmlns:p14="http://schemas.microsoft.com/office/powerpoint/2010/main" id="1" dur="indefinite" restart="never" nodeType="tmRoot"/>
+        <p:cTn id="1" dur="indefinite" restart="never" nodeType="tmRoot"/>
       </p:par>
     </p:tnLst>
   </p:timing>

</xml_diff>